<commit_message>
Power Point wants me to Commit I guess...
</commit_message>
<xml_diff>
--- a/Documents/UseCasePresentation.pptx
+++ b/Documents/UseCasePresentation.pptx
@@ -109,6 +109,11 @@
       </a:defRPr>
     </a:lvl9pPr>
   </p:defaultTextStyle>
+  <p:extLst>
+    <p:ext uri="{EFAFB233-063F-42B5-8137-9DF3F51BA10A}">
+      <p15:sldGuideLst xmlns:p15="http://schemas.microsoft.com/office/powerpoint/2012/main"/>
+    </p:ext>
+  </p:extLst>
 </p:presentation>
 </file>
 
@@ -298,7 +303,7 @@
           <a:p>
             <a:fld id="{4AAD347D-5ACD-4C99-B74B-A9C85AD731AF}" type="datetimeFigureOut">
               <a:rPr lang="en-US" dirty="0"/>
-              <a:t>11/15/2016</a:t>
+              <a:t>11/16/2016</a:t>
             </a:fld>
             <a:endParaRPr lang="en-US" dirty="0"/>
           </a:p>
@@ -568,7 +573,7 @@
           <a:p>
             <a:fld id="{4509A250-FF31-4206-8172-F9D3106AACB1}" type="datetimeFigureOut">
               <a:rPr lang="en-US" dirty="0"/>
-              <a:t>11/15/2016</a:t>
+              <a:t>11/16/2016</a:t>
             </a:fld>
             <a:endParaRPr lang="en-US" dirty="0"/>
           </a:p>
@@ -757,7 +762,7 @@
           <a:p>
             <a:fld id="{4509A250-FF31-4206-8172-F9D3106AACB1}" type="datetimeFigureOut">
               <a:rPr lang="en-US" dirty="0"/>
-              <a:t>11/15/2016</a:t>
+              <a:t>11/16/2016</a:t>
             </a:fld>
             <a:endParaRPr lang="en-US" dirty="0"/>
           </a:p>
@@ -1025,7 +1030,7 @@
           <a:p>
             <a:fld id="{4509A250-FF31-4206-8172-F9D3106AACB1}" type="datetimeFigureOut">
               <a:rPr lang="en-US" dirty="0"/>
-              <a:t>11/15/2016</a:t>
+              <a:t>11/16/2016</a:t>
             </a:fld>
             <a:endParaRPr lang="en-US" dirty="0"/>
           </a:p>
@@ -1361,7 +1366,7 @@
           <a:p>
             <a:fld id="{4509A250-FF31-4206-8172-F9D3106AACB1}" type="datetimeFigureOut">
               <a:rPr lang="en-US" dirty="0"/>
-              <a:t>11/15/2016</a:t>
+              <a:t>11/16/2016</a:t>
             </a:fld>
             <a:endParaRPr lang="en-US" dirty="0"/>
           </a:p>
@@ -1979,7 +1984,7 @@
           <a:p>
             <a:fld id="{4509A250-FF31-4206-8172-F9D3106AACB1}" type="datetimeFigureOut">
               <a:rPr lang="en-US" dirty="0"/>
-              <a:t>11/15/2016</a:t>
+              <a:t>11/16/2016</a:t>
             </a:fld>
             <a:endParaRPr lang="en-US" dirty="0"/>
           </a:p>
@@ -2834,7 +2839,7 @@
           <a:p>
             <a:fld id="{4509A250-FF31-4206-8172-F9D3106AACB1}" type="datetimeFigureOut">
               <a:rPr lang="en-US" dirty="0"/>
-              <a:t>11/15/2016</a:t>
+              <a:t>11/16/2016</a:t>
             </a:fld>
             <a:endParaRPr lang="en-US" dirty="0"/>
           </a:p>
@@ -2999,7 +3004,7 @@
           <a:p>
             <a:fld id="{4509A250-FF31-4206-8172-F9D3106AACB1}" type="datetimeFigureOut">
               <a:rPr lang="en-US" dirty="0"/>
-              <a:t>11/15/2016</a:t>
+              <a:t>11/16/2016</a:t>
             </a:fld>
             <a:endParaRPr lang="en-US" dirty="0"/>
           </a:p>
@@ -3174,7 +3179,7 @@
           <a:p>
             <a:fld id="{4509A250-FF31-4206-8172-F9D3106AACB1}" type="datetimeFigureOut">
               <a:rPr lang="en-US" dirty="0"/>
-              <a:t>11/15/2016</a:t>
+              <a:t>11/16/2016</a:t>
             </a:fld>
             <a:endParaRPr lang="en-US" dirty="0"/>
           </a:p>
@@ -3339,7 +3344,7 @@
           <a:p>
             <a:fld id="{4509A250-FF31-4206-8172-F9D3106AACB1}" type="datetimeFigureOut">
               <a:rPr lang="en-US" dirty="0"/>
-              <a:t>11/15/2016</a:t>
+              <a:t>11/16/2016</a:t>
             </a:fld>
             <a:endParaRPr lang="en-US" dirty="0"/>
           </a:p>
@@ -3581,7 +3586,7 @@
           <a:p>
             <a:fld id="{9796027F-7875-4030-9381-8BD8C4F21935}" type="datetimeFigureOut">
               <a:rPr lang="en-US" dirty="0"/>
-              <a:t>11/15/2016</a:t>
+              <a:t>11/16/2016</a:t>
             </a:fld>
             <a:endParaRPr lang="en-US" dirty="0"/>
           </a:p>
@@ -3868,7 +3873,7 @@
           <a:p>
             <a:fld id="{9796027F-7875-4030-9381-8BD8C4F21935}" type="datetimeFigureOut">
               <a:rPr lang="en-US" dirty="0"/>
-              <a:t>11/15/2016</a:t>
+              <a:t>11/16/2016</a:t>
             </a:fld>
             <a:endParaRPr lang="en-US" dirty="0"/>
           </a:p>
@@ -4307,7 +4312,7 @@
           <a:p>
             <a:fld id="{9796027F-7875-4030-9381-8BD8C4F21935}" type="datetimeFigureOut">
               <a:rPr lang="en-US" dirty="0"/>
-              <a:t>11/15/2016</a:t>
+              <a:t>11/16/2016</a:t>
             </a:fld>
             <a:endParaRPr lang="en-US" dirty="0"/>
           </a:p>
@@ -4420,7 +4425,7 @@
           <a:p>
             <a:fld id="{4509A250-FF31-4206-8172-F9D3106AACB1}" type="datetimeFigureOut">
               <a:rPr lang="en-US" dirty="0"/>
-              <a:t>11/15/2016</a:t>
+              <a:t>11/16/2016</a:t>
             </a:fld>
             <a:endParaRPr lang="en-US" dirty="0"/>
           </a:p>
@@ -4510,7 +4515,7 @@
           <a:p>
             <a:fld id="{4509A250-FF31-4206-8172-F9D3106AACB1}" type="datetimeFigureOut">
               <a:rPr lang="en-US" dirty="0"/>
-              <a:t>11/15/2016</a:t>
+              <a:t>11/16/2016</a:t>
             </a:fld>
             <a:endParaRPr lang="en-US" dirty="0"/>
           </a:p>
@@ -4784,7 +4789,7 @@
           <a:p>
             <a:fld id="{4509A250-FF31-4206-8172-F9D3106AACB1}" type="datetimeFigureOut">
               <a:rPr lang="en-US" dirty="0"/>
-              <a:t>11/15/2016</a:t>
+              <a:t>11/16/2016</a:t>
             </a:fld>
             <a:endParaRPr lang="en-US" dirty="0"/>
           </a:p>
@@ -5054,7 +5059,7 @@
           <a:p>
             <a:fld id="{4509A250-FF31-4206-8172-F9D3106AACB1}" type="datetimeFigureOut">
               <a:rPr lang="en-US" dirty="0"/>
-              <a:t>11/15/2016</a:t>
+              <a:t>11/16/2016</a:t>
             </a:fld>
             <a:endParaRPr lang="en-US" dirty="0"/>
           </a:p>
@@ -5478,7 +5483,7 @@
           <a:p>
             <a:fld id="{4AAD347D-5ACD-4C99-B74B-A9C85AD731AF}" type="datetimeFigureOut">
               <a:rPr lang="en-US" dirty="0"/>
-              <a:t>11/15/2016</a:t>
+              <a:t>11/16/2016</a:t>
             </a:fld>
             <a:endParaRPr lang="en-US" dirty="0"/>
           </a:p>
@@ -6221,7 +6226,6 @@
               <a:rPr lang="en-US" dirty="0"/>
               <a:t>**Trigger:** Player begins setup.</a:t>
             </a:r>
-            <a:endParaRPr lang="en-US" dirty="0"/>
           </a:p>
         </p:txBody>
       </p:sp>
@@ -6423,7 +6427,6 @@
               <a:rPr lang="en-US" dirty="0"/>
               <a:t>12. The player returns to the select character screen and can continue from 3. or end the game.</a:t>
             </a:r>
-            <a:endParaRPr lang="en-US" dirty="0"/>
           </a:p>
         </p:txBody>
       </p:sp>
@@ -6559,7 +6562,6 @@
               <a:rPr lang="en-US" sz="2800" dirty="0"/>
               <a:t>time or stock rules.</a:t>
             </a:r>
-            <a:endParaRPr lang="en-US" sz="2800" dirty="0"/>
           </a:p>
         </p:txBody>
       </p:sp>
@@ -6851,7 +6853,6 @@
               <a:rPr lang="en-US" sz="2600" dirty="0"/>
               <a:t>**Due Date:** release 1.0</a:t>
             </a:r>
-            <a:endParaRPr lang="en-US" sz="2600" dirty="0"/>
           </a:p>
         </p:txBody>
       </p:sp>

</xml_diff>